<commit_message>
Final poster and code.
</commit_message>
<xml_diff>
--- a/Presentation/Poster.pptx
+++ b/Presentation/Poster.pptx
@@ -8,7 +8,7 @@
     <p:sldId id="256" r:id="rId2"/>
   </p:sldIdLst>
   <p:sldSz cx="30275213" cy="42803763"/>
-  <p:notesSz cx="7104063" cy="10234613"/>
+  <p:notesSz cx="7102475" cy="10233025"/>
   <p:defaultTextStyle>
     <a:defPPr>
       <a:defRPr lang="en-US"/>
@@ -154,7 +154,7 @@
           </a:lstStyle>
           <a:p>
             <a:r>
-              <a:rPr lang="en-US" smtClean="0"/>
+              <a:rPr lang="en-US"/>
               <a:t>Click to edit Master title style</a:t>
             </a:r>
             <a:endParaRPr lang="en-US" dirty="0"/>
@@ -219,7 +219,7 @@
           </a:lstStyle>
           <a:p>
             <a:r>
-              <a:rPr lang="en-US" smtClean="0"/>
+              <a:rPr lang="en-US"/>
               <a:t>Click to edit Master subtitle style</a:t>
             </a:r>
             <a:endParaRPr lang="en-US" dirty="0"/>
@@ -243,7 +243,7 @@
           <a:p>
             <a:fld id="{ADE99B15-4664-468D-85FF-32921E5F6364}" type="datetimeFigureOut">
               <a:rPr lang="en-GB" smtClean="0"/>
-              <a:t>16/01/2019</a:t>
+              <a:t>20/01/2019</a:t>
             </a:fld>
             <a:endParaRPr lang="en-GB"/>
           </a:p>
@@ -337,7 +337,7 @@
           <a:lstStyle/>
           <a:p>
             <a:r>
-              <a:rPr lang="en-US" smtClean="0"/>
+              <a:rPr lang="en-US"/>
               <a:t>Click to edit Master title style</a:t>
             </a:r>
             <a:endParaRPr lang="en-US" dirty="0"/>
@@ -361,35 +361,35 @@
           <a:p>
             <a:pPr lvl="0"/>
             <a:r>
-              <a:rPr lang="en-US" smtClean="0"/>
+              <a:rPr lang="en-US"/>
               <a:t>Edit Master text styles</a:t>
             </a:r>
           </a:p>
           <a:p>
             <a:pPr lvl="1"/>
             <a:r>
-              <a:rPr lang="en-US" smtClean="0"/>
+              <a:rPr lang="en-US"/>
               <a:t>Second level</a:t>
             </a:r>
           </a:p>
           <a:p>
             <a:pPr lvl="2"/>
             <a:r>
-              <a:rPr lang="en-US" smtClean="0"/>
+              <a:rPr lang="en-US"/>
               <a:t>Third level</a:t>
             </a:r>
           </a:p>
           <a:p>
             <a:pPr lvl="3"/>
             <a:r>
-              <a:rPr lang="en-US" smtClean="0"/>
+              <a:rPr lang="en-US"/>
               <a:t>Fourth level</a:t>
             </a:r>
           </a:p>
           <a:p>
             <a:pPr lvl="4"/>
             <a:r>
-              <a:rPr lang="en-US" smtClean="0"/>
+              <a:rPr lang="en-US"/>
               <a:t>Fifth level</a:t>
             </a:r>
             <a:endParaRPr lang="en-US" dirty="0"/>
@@ -413,7 +413,7 @@
           <a:p>
             <a:fld id="{ADE99B15-4664-468D-85FF-32921E5F6364}" type="datetimeFigureOut">
               <a:rPr lang="en-GB" smtClean="0"/>
-              <a:t>16/01/2019</a:t>
+              <a:t>20/01/2019</a:t>
             </a:fld>
             <a:endParaRPr lang="en-GB"/>
           </a:p>
@@ -512,7 +512,7 @@
           <a:lstStyle/>
           <a:p>
             <a:r>
-              <a:rPr lang="en-US" smtClean="0"/>
+              <a:rPr lang="en-US"/>
               <a:t>Click to edit Master title style</a:t>
             </a:r>
             <a:endParaRPr lang="en-US" dirty="0"/>
@@ -541,35 +541,35 @@
           <a:p>
             <a:pPr lvl="0"/>
             <a:r>
-              <a:rPr lang="en-US" smtClean="0"/>
+              <a:rPr lang="en-US"/>
               <a:t>Edit Master text styles</a:t>
             </a:r>
           </a:p>
           <a:p>
             <a:pPr lvl="1"/>
             <a:r>
-              <a:rPr lang="en-US" smtClean="0"/>
+              <a:rPr lang="en-US"/>
               <a:t>Second level</a:t>
             </a:r>
           </a:p>
           <a:p>
             <a:pPr lvl="2"/>
             <a:r>
-              <a:rPr lang="en-US" smtClean="0"/>
+              <a:rPr lang="en-US"/>
               <a:t>Third level</a:t>
             </a:r>
           </a:p>
           <a:p>
             <a:pPr lvl="3"/>
             <a:r>
-              <a:rPr lang="en-US" smtClean="0"/>
+              <a:rPr lang="en-US"/>
               <a:t>Fourth level</a:t>
             </a:r>
           </a:p>
           <a:p>
             <a:pPr lvl="4"/>
             <a:r>
-              <a:rPr lang="en-US" smtClean="0"/>
+              <a:rPr lang="en-US"/>
               <a:t>Fifth level</a:t>
             </a:r>
             <a:endParaRPr lang="en-US" dirty="0"/>
@@ -593,7 +593,7 @@
           <a:p>
             <a:fld id="{ADE99B15-4664-468D-85FF-32921E5F6364}" type="datetimeFigureOut">
               <a:rPr lang="en-GB" smtClean="0"/>
-              <a:t>16/01/2019</a:t>
+              <a:t>20/01/2019</a:t>
             </a:fld>
             <a:endParaRPr lang="en-GB"/>
           </a:p>
@@ -687,7 +687,7 @@
           <a:lstStyle/>
           <a:p>
             <a:r>
-              <a:rPr lang="en-US" smtClean="0"/>
+              <a:rPr lang="en-US"/>
               <a:t>Click to edit Master title style</a:t>
             </a:r>
             <a:endParaRPr lang="en-US" dirty="0"/>
@@ -711,35 +711,35 @@
           <a:p>
             <a:pPr lvl="0"/>
             <a:r>
-              <a:rPr lang="en-US" smtClean="0"/>
+              <a:rPr lang="en-US"/>
               <a:t>Edit Master text styles</a:t>
             </a:r>
           </a:p>
           <a:p>
             <a:pPr lvl="1"/>
             <a:r>
-              <a:rPr lang="en-US" smtClean="0"/>
+              <a:rPr lang="en-US"/>
               <a:t>Second level</a:t>
             </a:r>
           </a:p>
           <a:p>
             <a:pPr lvl="2"/>
             <a:r>
-              <a:rPr lang="en-US" smtClean="0"/>
+              <a:rPr lang="en-US"/>
               <a:t>Third level</a:t>
             </a:r>
           </a:p>
           <a:p>
             <a:pPr lvl="3"/>
             <a:r>
-              <a:rPr lang="en-US" smtClean="0"/>
+              <a:rPr lang="en-US"/>
               <a:t>Fourth level</a:t>
             </a:r>
           </a:p>
           <a:p>
             <a:pPr lvl="4"/>
             <a:r>
-              <a:rPr lang="en-US" smtClean="0"/>
+              <a:rPr lang="en-US"/>
               <a:t>Fifth level</a:t>
             </a:r>
             <a:endParaRPr lang="en-US" dirty="0"/>
@@ -763,7 +763,7 @@
           <a:p>
             <a:fld id="{ADE99B15-4664-468D-85FF-32921E5F6364}" type="datetimeFigureOut">
               <a:rPr lang="en-GB" smtClean="0"/>
-              <a:t>16/01/2019</a:t>
+              <a:t>20/01/2019</a:t>
             </a:fld>
             <a:endParaRPr lang="en-GB"/>
           </a:p>
@@ -866,7 +866,7 @@
           </a:lstStyle>
           <a:p>
             <a:r>
-              <a:rPr lang="en-US" smtClean="0"/>
+              <a:rPr lang="en-US"/>
               <a:t>Click to edit Master title style</a:t>
             </a:r>
             <a:endParaRPr lang="en-US" dirty="0"/>
@@ -984,7 +984,7 @@
           <a:p>
             <a:pPr lvl="0"/>
             <a:r>
-              <a:rPr lang="en-US" smtClean="0"/>
+              <a:rPr lang="en-US"/>
               <a:t>Edit Master text styles</a:t>
             </a:r>
           </a:p>
@@ -1007,7 +1007,7 @@
           <a:p>
             <a:fld id="{ADE99B15-4664-468D-85FF-32921E5F6364}" type="datetimeFigureOut">
               <a:rPr lang="en-GB" smtClean="0"/>
-              <a:t>16/01/2019</a:t>
+              <a:t>20/01/2019</a:t>
             </a:fld>
             <a:endParaRPr lang="en-GB"/>
           </a:p>
@@ -1101,7 +1101,7 @@
           <a:lstStyle/>
           <a:p>
             <a:r>
-              <a:rPr lang="en-US" smtClean="0"/>
+              <a:rPr lang="en-US"/>
               <a:t>Click to edit Master title style</a:t>
             </a:r>
             <a:endParaRPr lang="en-US" dirty="0"/>
@@ -1130,35 +1130,35 @@
           <a:p>
             <a:pPr lvl="0"/>
             <a:r>
-              <a:rPr lang="en-US" smtClean="0"/>
+              <a:rPr lang="en-US"/>
               <a:t>Edit Master text styles</a:t>
             </a:r>
           </a:p>
           <a:p>
             <a:pPr lvl="1"/>
             <a:r>
-              <a:rPr lang="en-US" smtClean="0"/>
+              <a:rPr lang="en-US"/>
               <a:t>Second level</a:t>
             </a:r>
           </a:p>
           <a:p>
             <a:pPr lvl="2"/>
             <a:r>
-              <a:rPr lang="en-US" smtClean="0"/>
+              <a:rPr lang="en-US"/>
               <a:t>Third level</a:t>
             </a:r>
           </a:p>
           <a:p>
             <a:pPr lvl="3"/>
             <a:r>
-              <a:rPr lang="en-US" smtClean="0"/>
+              <a:rPr lang="en-US"/>
               <a:t>Fourth level</a:t>
             </a:r>
           </a:p>
           <a:p>
             <a:pPr lvl="4"/>
             <a:r>
-              <a:rPr lang="en-US" smtClean="0"/>
+              <a:rPr lang="en-US"/>
               <a:t>Fifth level</a:t>
             </a:r>
             <a:endParaRPr lang="en-US" dirty="0"/>
@@ -1187,35 +1187,35 @@
           <a:p>
             <a:pPr lvl="0"/>
             <a:r>
-              <a:rPr lang="en-US" smtClean="0"/>
+              <a:rPr lang="en-US"/>
               <a:t>Edit Master text styles</a:t>
             </a:r>
           </a:p>
           <a:p>
             <a:pPr lvl="1"/>
             <a:r>
-              <a:rPr lang="en-US" smtClean="0"/>
+              <a:rPr lang="en-US"/>
               <a:t>Second level</a:t>
             </a:r>
           </a:p>
           <a:p>
             <a:pPr lvl="2"/>
             <a:r>
-              <a:rPr lang="en-US" smtClean="0"/>
+              <a:rPr lang="en-US"/>
               <a:t>Third level</a:t>
             </a:r>
           </a:p>
           <a:p>
             <a:pPr lvl="3"/>
             <a:r>
-              <a:rPr lang="en-US" smtClean="0"/>
+              <a:rPr lang="en-US"/>
               <a:t>Fourth level</a:t>
             </a:r>
           </a:p>
           <a:p>
             <a:pPr lvl="4"/>
             <a:r>
-              <a:rPr lang="en-US" smtClean="0"/>
+              <a:rPr lang="en-US"/>
               <a:t>Fifth level</a:t>
             </a:r>
             <a:endParaRPr lang="en-US" dirty="0"/>
@@ -1239,7 +1239,7 @@
           <a:p>
             <a:fld id="{ADE99B15-4664-468D-85FF-32921E5F6364}" type="datetimeFigureOut">
               <a:rPr lang="en-GB" smtClean="0"/>
-              <a:t>16/01/2019</a:t>
+              <a:t>20/01/2019</a:t>
             </a:fld>
             <a:endParaRPr lang="en-GB"/>
           </a:p>
@@ -1338,7 +1338,7 @@
           <a:lstStyle/>
           <a:p>
             <a:r>
-              <a:rPr lang="en-US" smtClean="0"/>
+              <a:rPr lang="en-US"/>
               <a:t>Click to edit Master title style</a:t>
             </a:r>
             <a:endParaRPr lang="en-US" dirty="0"/>
@@ -1404,7 +1404,7 @@
           <a:p>
             <a:pPr lvl="0"/>
             <a:r>
-              <a:rPr lang="en-US" smtClean="0"/>
+              <a:rPr lang="en-US"/>
               <a:t>Edit Master text styles</a:t>
             </a:r>
           </a:p>
@@ -1432,35 +1432,35 @@
           <a:p>
             <a:pPr lvl="0"/>
             <a:r>
-              <a:rPr lang="en-US" smtClean="0"/>
+              <a:rPr lang="en-US"/>
               <a:t>Edit Master text styles</a:t>
             </a:r>
           </a:p>
           <a:p>
             <a:pPr lvl="1"/>
             <a:r>
-              <a:rPr lang="en-US" smtClean="0"/>
+              <a:rPr lang="en-US"/>
               <a:t>Second level</a:t>
             </a:r>
           </a:p>
           <a:p>
             <a:pPr lvl="2"/>
             <a:r>
-              <a:rPr lang="en-US" smtClean="0"/>
+              <a:rPr lang="en-US"/>
               <a:t>Third level</a:t>
             </a:r>
           </a:p>
           <a:p>
             <a:pPr lvl="3"/>
             <a:r>
-              <a:rPr lang="en-US" smtClean="0"/>
+              <a:rPr lang="en-US"/>
               <a:t>Fourth level</a:t>
             </a:r>
           </a:p>
           <a:p>
             <a:pPr lvl="4"/>
             <a:r>
-              <a:rPr lang="en-US" smtClean="0"/>
+              <a:rPr lang="en-US"/>
               <a:t>Fifth level</a:t>
             </a:r>
             <a:endParaRPr lang="en-US" dirty="0"/>
@@ -1526,7 +1526,7 @@
           <a:p>
             <a:pPr lvl="0"/>
             <a:r>
-              <a:rPr lang="en-US" smtClean="0"/>
+              <a:rPr lang="en-US"/>
               <a:t>Edit Master text styles</a:t>
             </a:r>
           </a:p>
@@ -1554,35 +1554,35 @@
           <a:p>
             <a:pPr lvl="0"/>
             <a:r>
-              <a:rPr lang="en-US" smtClean="0"/>
+              <a:rPr lang="en-US"/>
               <a:t>Edit Master text styles</a:t>
             </a:r>
           </a:p>
           <a:p>
             <a:pPr lvl="1"/>
             <a:r>
-              <a:rPr lang="en-US" smtClean="0"/>
+              <a:rPr lang="en-US"/>
               <a:t>Second level</a:t>
             </a:r>
           </a:p>
           <a:p>
             <a:pPr lvl="2"/>
             <a:r>
-              <a:rPr lang="en-US" smtClean="0"/>
+              <a:rPr lang="en-US"/>
               <a:t>Third level</a:t>
             </a:r>
           </a:p>
           <a:p>
             <a:pPr lvl="3"/>
             <a:r>
-              <a:rPr lang="en-US" smtClean="0"/>
+              <a:rPr lang="en-US"/>
               <a:t>Fourth level</a:t>
             </a:r>
           </a:p>
           <a:p>
             <a:pPr lvl="4"/>
             <a:r>
-              <a:rPr lang="en-US" smtClean="0"/>
+              <a:rPr lang="en-US"/>
               <a:t>Fifth level</a:t>
             </a:r>
             <a:endParaRPr lang="en-US" dirty="0"/>
@@ -1606,7 +1606,7 @@
           <a:p>
             <a:fld id="{ADE99B15-4664-468D-85FF-32921E5F6364}" type="datetimeFigureOut">
               <a:rPr lang="en-GB" smtClean="0"/>
-              <a:t>16/01/2019</a:t>
+              <a:t>20/01/2019</a:t>
             </a:fld>
             <a:endParaRPr lang="en-GB"/>
           </a:p>
@@ -1700,7 +1700,7 @@
           <a:lstStyle/>
           <a:p>
             <a:r>
-              <a:rPr lang="en-US" smtClean="0"/>
+              <a:rPr lang="en-US"/>
               <a:t>Click to edit Master title style</a:t>
             </a:r>
             <a:endParaRPr lang="en-US" dirty="0"/>
@@ -1724,7 +1724,7 @@
           <a:p>
             <a:fld id="{ADE99B15-4664-468D-85FF-32921E5F6364}" type="datetimeFigureOut">
               <a:rPr lang="en-GB" smtClean="0"/>
-              <a:t>16/01/2019</a:t>
+              <a:t>20/01/2019</a:t>
             </a:fld>
             <a:endParaRPr lang="en-GB"/>
           </a:p>
@@ -1819,7 +1819,7 @@
           <a:p>
             <a:fld id="{ADE99B15-4664-468D-85FF-32921E5F6364}" type="datetimeFigureOut">
               <a:rPr lang="en-GB" smtClean="0"/>
-              <a:t>16/01/2019</a:t>
+              <a:t>20/01/2019</a:t>
             </a:fld>
             <a:endParaRPr lang="en-GB"/>
           </a:p>
@@ -1922,7 +1922,7 @@
           </a:lstStyle>
           <a:p>
             <a:r>
-              <a:rPr lang="en-US" smtClean="0"/>
+              <a:rPr lang="en-US"/>
               <a:t>Click to edit Master title style</a:t>
             </a:r>
             <a:endParaRPr lang="en-US" dirty="0"/>
@@ -1979,35 +1979,35 @@
           <a:p>
             <a:pPr lvl="0"/>
             <a:r>
-              <a:rPr lang="en-US" smtClean="0"/>
+              <a:rPr lang="en-US"/>
               <a:t>Edit Master text styles</a:t>
             </a:r>
           </a:p>
           <a:p>
             <a:pPr lvl="1"/>
             <a:r>
-              <a:rPr lang="en-US" smtClean="0"/>
+              <a:rPr lang="en-US"/>
               <a:t>Second level</a:t>
             </a:r>
           </a:p>
           <a:p>
             <a:pPr lvl="2"/>
             <a:r>
-              <a:rPr lang="en-US" smtClean="0"/>
+              <a:rPr lang="en-US"/>
               <a:t>Third level</a:t>
             </a:r>
           </a:p>
           <a:p>
             <a:pPr lvl="3"/>
             <a:r>
-              <a:rPr lang="en-US" smtClean="0"/>
+              <a:rPr lang="en-US"/>
               <a:t>Fourth level</a:t>
             </a:r>
           </a:p>
           <a:p>
             <a:pPr lvl="4"/>
             <a:r>
-              <a:rPr lang="en-US" smtClean="0"/>
+              <a:rPr lang="en-US"/>
               <a:t>Fifth level</a:t>
             </a:r>
             <a:endParaRPr lang="en-US" dirty="0"/>
@@ -2073,7 +2073,7 @@
           <a:p>
             <a:pPr lvl="0"/>
             <a:r>
-              <a:rPr lang="en-US" smtClean="0"/>
+              <a:rPr lang="en-US"/>
               <a:t>Edit Master text styles</a:t>
             </a:r>
           </a:p>
@@ -2096,7 +2096,7 @@
           <a:p>
             <a:fld id="{ADE99B15-4664-468D-85FF-32921E5F6364}" type="datetimeFigureOut">
               <a:rPr lang="en-GB" smtClean="0"/>
-              <a:t>16/01/2019</a:t>
+              <a:t>20/01/2019</a:t>
             </a:fld>
             <a:endParaRPr lang="en-GB"/>
           </a:p>
@@ -2199,7 +2199,7 @@
           </a:lstStyle>
           <a:p>
             <a:r>
-              <a:rPr lang="en-US" smtClean="0"/>
+              <a:rPr lang="en-US"/>
               <a:t>Click to edit Master title style</a:t>
             </a:r>
             <a:endParaRPr lang="en-US" dirty="0"/>
@@ -2264,7 +2264,7 @@
           </a:lstStyle>
           <a:p>
             <a:r>
-              <a:rPr lang="en-US" smtClean="0"/>
+              <a:rPr lang="en-US"/>
               <a:t>Click icon to add picture</a:t>
             </a:r>
             <a:endParaRPr lang="en-US" dirty="0"/>
@@ -2330,7 +2330,7 @@
           <a:p>
             <a:pPr lvl="0"/>
             <a:r>
-              <a:rPr lang="en-US" smtClean="0"/>
+              <a:rPr lang="en-US"/>
               <a:t>Edit Master text styles</a:t>
             </a:r>
           </a:p>
@@ -2353,7 +2353,7 @@
           <a:p>
             <a:fld id="{ADE99B15-4664-468D-85FF-32921E5F6364}" type="datetimeFigureOut">
               <a:rPr lang="en-GB" smtClean="0"/>
-              <a:t>16/01/2019</a:t>
+              <a:t>20/01/2019</a:t>
             </a:fld>
             <a:endParaRPr lang="en-GB"/>
           </a:p>
@@ -2462,7 +2462,7 @@
           <a:lstStyle/>
           <a:p>
             <a:r>
-              <a:rPr lang="en-US" smtClean="0"/>
+              <a:rPr lang="en-US"/>
               <a:t>Click to edit Master title style</a:t>
             </a:r>
             <a:endParaRPr lang="en-US" dirty="0"/>
@@ -2496,35 +2496,35 @@
           <a:p>
             <a:pPr lvl="0"/>
             <a:r>
-              <a:rPr lang="en-US" smtClean="0"/>
+              <a:rPr lang="en-US"/>
               <a:t>Edit Master text styles</a:t>
             </a:r>
           </a:p>
           <a:p>
             <a:pPr lvl="1"/>
             <a:r>
-              <a:rPr lang="en-US" smtClean="0"/>
+              <a:rPr lang="en-US"/>
               <a:t>Second level</a:t>
             </a:r>
           </a:p>
           <a:p>
             <a:pPr lvl="2"/>
             <a:r>
-              <a:rPr lang="en-US" smtClean="0"/>
+              <a:rPr lang="en-US"/>
               <a:t>Third level</a:t>
             </a:r>
           </a:p>
           <a:p>
             <a:pPr lvl="3"/>
             <a:r>
-              <a:rPr lang="en-US" smtClean="0"/>
+              <a:rPr lang="en-US"/>
               <a:t>Fourth level</a:t>
             </a:r>
           </a:p>
           <a:p>
             <a:pPr lvl="4"/>
             <a:r>
-              <a:rPr lang="en-US" smtClean="0"/>
+              <a:rPr lang="en-US"/>
               <a:t>Fifth level</a:t>
             </a:r>
             <a:endParaRPr lang="en-US" dirty="0"/>
@@ -2566,7 +2566,7 @@
           <a:p>
             <a:fld id="{ADE99B15-4664-468D-85FF-32921E5F6364}" type="datetimeFigureOut">
               <a:rPr lang="en-GB" smtClean="0"/>
-              <a:t>16/01/2019</a:t>
+              <a:t>20/01/2019</a:t>
             </a:fld>
             <a:endParaRPr lang="en-GB"/>
           </a:p>
@@ -3035,8 +3035,8 @@
         </p:nvSpPr>
         <p:spPr>
           <a:xfrm>
-            <a:off x="11070772" y="33211359"/>
-            <a:ext cx="19040832" cy="8094524"/>
+            <a:off x="11218257" y="33270353"/>
+            <a:ext cx="19040832" cy="7294305"/>
           </a:xfrm>
           <a:prstGeom prst="rect">
             <a:avLst/>
@@ -3050,7 +3050,7 @@
           <a:lstStyle/>
           <a:p>
             <a:r>
-              <a:rPr lang="en-GB" sz="4000" dirty="0" smtClean="0">
+              <a:rPr lang="en-GB" sz="3600">
                 <a:latin typeface="Lucida Console" panose="020B0609040504020204" pitchFamily="49" charset="0"/>
               </a:rPr>
               <a:t>The final solution of the </a:t>
@@ -3058,7 +3058,7 @@
           </a:p>
           <a:p>
             <a:r>
-              <a:rPr lang="en-GB" sz="4000" dirty="0" smtClean="0">
+              <a:rPr lang="en-GB" sz="3600">
                 <a:latin typeface="Lucida Console" panose="020B0609040504020204" pitchFamily="49" charset="0"/>
               </a:rPr>
               <a:t>Sudoku emerges when the </a:t>
@@ -3066,7 +3066,7 @@
           </a:p>
           <a:p>
             <a:r>
-              <a:rPr lang="en-GB" sz="4000" dirty="0" smtClean="0">
+              <a:rPr lang="en-GB" sz="3600">
                 <a:latin typeface="Lucida Console" panose="020B0609040504020204" pitchFamily="49" charset="0"/>
               </a:rPr>
               <a:t>described bits and pieces </a:t>
@@ -3074,7 +3074,7 @@
           </a:p>
           <a:p>
             <a:r>
-              <a:rPr lang="en-GB" sz="4000" dirty="0" smtClean="0">
+              <a:rPr lang="en-GB" sz="3600">
                 <a:latin typeface="Lucida Console" panose="020B0609040504020204" pitchFamily="49" charset="0"/>
               </a:rPr>
               <a:t>come together. To solve a </a:t>
@@ -3082,7 +3082,7 @@
           </a:p>
           <a:p>
             <a:r>
-              <a:rPr lang="en-GB" sz="4000" dirty="0" smtClean="0">
+              <a:rPr lang="en-GB" sz="3600">
                 <a:latin typeface="Lucida Console" panose="020B0609040504020204" pitchFamily="49" charset="0"/>
               </a:rPr>
               <a:t>Sudoku, the first step is </a:t>
@@ -3090,7 +3090,7 @@
           </a:p>
           <a:p>
             <a:r>
-              <a:rPr lang="en-GB" sz="4000" dirty="0" smtClean="0">
+              <a:rPr lang="en-GB" sz="3600">
                 <a:latin typeface="Lucida Console" panose="020B0609040504020204" pitchFamily="49" charset="0"/>
               </a:rPr>
               <a:t>to propagate constraints. </a:t>
@@ -3098,7 +3098,7 @@
           </a:p>
           <a:p>
             <a:r>
-              <a:rPr lang="en-GB" sz="4000" dirty="0" smtClean="0">
+              <a:rPr lang="en-GB" sz="3600">
                 <a:latin typeface="Lucida Console" panose="020B0609040504020204" pitchFamily="49" charset="0"/>
               </a:rPr>
               <a:t>Then the global pheromone </a:t>
@@ -3106,15 +3106,15 @@
           </a:p>
           <a:p>
             <a:r>
-              <a:rPr lang="en-GB" sz="4000" dirty="0" smtClean="0">
+              <a:rPr lang="en-GB" sz="3600">
                 <a:latin typeface="Lucida Console" panose="020B0609040504020204" pitchFamily="49" charset="0"/>
               </a:rPr>
-              <a:t>map is initialized and </a:t>
-            </a:r>
-          </a:p>
-          <a:p>
-            <a:r>
-              <a:rPr lang="en-GB" sz="4000" dirty="0" smtClean="0">
+              <a:t>table is initialized and </a:t>
+            </a:r>
+          </a:p>
+          <a:p>
+            <a:r>
+              <a:rPr lang="en-GB" sz="3600">
                 <a:latin typeface="Lucida Console" panose="020B0609040504020204" pitchFamily="49" charset="0"/>
               </a:rPr>
               <a:t>ants are generated. Each </a:t>
@@ -3122,14 +3122,11 @@
           </a:p>
           <a:p>
             <a:r>
-              <a:rPr lang="en-GB" sz="4000" dirty="0" smtClean="0">
+              <a:rPr lang="en-GB" sz="3600">
                 <a:latin typeface="Lucida Console" panose="020B0609040504020204" pitchFamily="49" charset="0"/>
               </a:rPr>
-              <a:t>ant receives a copy of the Sudoku and starts to travel through it. Based on “best ant’s” result, the global pheromone map is updated. New ants from next generation use this as their guide, until the Sudoku is solved</a:t>
-            </a:r>
-            <a:endParaRPr lang="en-GB" sz="4000" dirty="0">
-              <a:latin typeface="Lucida Console" panose="020B0609040504020204" pitchFamily="49" charset="0"/>
-            </a:endParaRPr>
+              <a:t>ant receives a copy of the Sudoku and starts to travel through it. Based on “best ant’s” result, the global pheromone map is updated. New ants from next generation use this as their guide, until the Sudoku is solved.</a:t>
+            </a:r>
           </a:p>
         </p:txBody>
       </p:sp>
@@ -3155,12 +3152,13 @@
         </p:blipFill>
         <p:spPr>
           <a:xfrm rot="20913542">
-            <a:off x="6839334" y="23583277"/>
+            <a:off x="6868831" y="23583277"/>
             <a:ext cx="5942752" cy="5634934"/>
           </a:xfrm>
           <a:prstGeom prst="rect">
             <a:avLst/>
           </a:prstGeom>
+          <a:noFill/>
         </p:spPr>
       </p:pic>
       <p:sp>
@@ -3186,24 +3184,15 @@
           <a:lstStyle/>
           <a:p>
             <a:r>
-              <a:rPr lang="en-GB" sz="11310" b="1" dirty="0">
+              <a:rPr lang="en-GB" sz="11310" b="1">
                 <a:latin typeface="Castellar" panose="020A0402060406010301" pitchFamily="18" charset="0"/>
               </a:rPr>
-              <a:t>Solving </a:t>
-            </a:r>
-            <a:r>
-              <a:rPr lang="en-GB" sz="11310" b="1" dirty="0" err="1">
-                <a:latin typeface="Castellar" panose="020A0402060406010301" pitchFamily="18" charset="0"/>
-              </a:rPr>
-              <a:t>Sudokus</a:t>
-            </a:r>
-            <a:endParaRPr lang="en-GB" sz="11310" b="1" dirty="0">
-              <a:latin typeface="Castellar" panose="020A0402060406010301" pitchFamily="18" charset="0"/>
-            </a:endParaRPr>
-          </a:p>
-          <a:p>
-            <a:r>
-              <a:rPr lang="en-GB" sz="11310" b="1" dirty="0">
+              <a:t>Solving Sudokus</a:t>
+            </a:r>
+          </a:p>
+          <a:p>
+            <a:r>
+              <a:rPr lang="en-GB" sz="11310" b="1">
                 <a:latin typeface="Castellar" panose="020A0402060406010301" pitchFamily="18" charset="0"/>
               </a:rPr>
               <a:t>With Ant Colony Optimisation</a:t>
@@ -3219,8 +3208,8 @@
         </p:nvSpPr>
         <p:spPr>
           <a:xfrm>
-            <a:off x="11159198" y="41525199"/>
-            <a:ext cx="19094727" cy="1077218"/>
+            <a:off x="11159198" y="40841853"/>
+            <a:ext cx="19094727" cy="2062103"/>
           </a:xfrm>
           <a:prstGeom prst="rect">
             <a:avLst/>
@@ -3234,46 +3223,32 @@
           <a:lstStyle/>
           <a:p>
             <a:r>
-              <a:rPr lang="en-GB" sz="3200" dirty="0" smtClean="0">
+              <a:rPr lang="en-GB" sz="3200">
                 <a:latin typeface="Lucida Console" panose="020B0609040504020204" pitchFamily="49" charset="0"/>
               </a:rPr>
-              <a:t>The project is based on the article: </a:t>
-            </a:r>
-            <a:r>
-              <a:rPr lang="en-GB" sz="3200" dirty="0">
+              <a:t>The project is based on the article: Lloyd H, Amos M. Solving Sudoku with </a:t>
+            </a:r>
+          </a:p>
+          <a:p>
+            <a:r>
+              <a:rPr lang="en-GB" sz="3200">
                 <a:latin typeface="Lucida Console" panose="020B0609040504020204" pitchFamily="49" charset="0"/>
               </a:rPr>
-              <a:t>Lloyd H, Amos M. Solving Sudoku with </a:t>
-            </a:r>
-            <a:endParaRPr lang="en-GB" sz="3200" dirty="0" smtClean="0">
+              <a:t>Ant Colony Optimisation. arXiv preprint arXiv:1805.03545. 2018 May 9.</a:t>
+            </a:r>
+          </a:p>
+          <a:p>
+            <a:r>
+              <a:rPr lang="en-GB" sz="3200">
+                <a:latin typeface="Lucida Console" panose="020B0609040504020204" pitchFamily="49" charset="0"/>
+              </a:rPr>
+              <a:t>Project available at: https://github.com/jyrigr/MTAT.03.238-Project</a:t>
+            </a:r>
+          </a:p>
+          <a:p>
+            <a:endParaRPr lang="en-GB" sz="3200">
               <a:latin typeface="Lucida Console" panose="020B0609040504020204" pitchFamily="49" charset="0"/>
             </a:endParaRPr>
-          </a:p>
-          <a:p>
-            <a:r>
-              <a:rPr lang="en-GB" sz="3200" dirty="0" smtClean="0">
-                <a:latin typeface="Lucida Console" panose="020B0609040504020204" pitchFamily="49" charset="0"/>
-              </a:rPr>
-              <a:t>Ant </a:t>
-            </a:r>
-            <a:r>
-              <a:rPr lang="en-GB" sz="3200" dirty="0">
-                <a:latin typeface="Lucida Console" panose="020B0609040504020204" pitchFamily="49" charset="0"/>
-              </a:rPr>
-              <a:t>Colony Optimisation. </a:t>
-            </a:r>
-            <a:r>
-              <a:rPr lang="en-GB" sz="3200" dirty="0" err="1">
-                <a:latin typeface="Lucida Console" panose="020B0609040504020204" pitchFamily="49" charset="0"/>
-              </a:rPr>
-              <a:t>arXiv</a:t>
-            </a:r>
-            <a:r>
-              <a:rPr lang="en-GB" sz="3200" dirty="0">
-                <a:latin typeface="Lucida Console" panose="020B0609040504020204" pitchFamily="49" charset="0"/>
-              </a:rPr>
-              <a:t> preprint arXiv:1805.03545. 2018 May 9.</a:t>
-            </a:r>
           </a:p>
         </p:txBody>
       </p:sp>
@@ -3285,7 +3260,7 @@
         </p:nvCxnSpPr>
         <p:spPr>
           <a:xfrm>
-            <a:off x="11159198" y="41525199"/>
+            <a:off x="11159198" y="40795152"/>
             <a:ext cx="19116015" cy="0"/>
           </a:xfrm>
           <a:prstGeom prst="line">
@@ -3331,71 +3306,35 @@
           <a:lstStyle/>
           <a:p>
             <a:r>
-              <a:rPr lang="en-GB" sz="6000" dirty="0" err="1" smtClean="0">
+              <a:rPr lang="en-GB" sz="6000">
                 <a:latin typeface="Lucida Console" panose="020B0609040504020204" pitchFamily="49" charset="0"/>
               </a:rPr>
-              <a:t>Jüri</a:t>
-            </a:r>
-            <a:r>
-              <a:rPr lang="en-GB" sz="6000" dirty="0" smtClean="0">
+              <a:t>Jüri Gramann, Raid Vellerind</a:t>
+            </a:r>
+          </a:p>
+          <a:p>
+            <a:r>
+              <a:rPr lang="en-GB" sz="6000">
                 <a:latin typeface="Lucida Console" panose="020B0609040504020204" pitchFamily="49" charset="0"/>
               </a:rPr>
-              <a:t> </a:t>
-            </a:r>
-            <a:r>
-              <a:rPr lang="en-GB" sz="6000" dirty="0" err="1" smtClean="0">
+              <a:t>University of Tartu</a:t>
+            </a:r>
+          </a:p>
+          <a:p>
+            <a:r>
+              <a:rPr lang="en-GB" sz="6000">
                 <a:latin typeface="Lucida Console" panose="020B0609040504020204" pitchFamily="49" charset="0"/>
               </a:rPr>
-              <a:t>Gramann</a:t>
-            </a:r>
-            <a:r>
-              <a:rPr lang="en-GB" sz="6000" dirty="0" smtClean="0">
+              <a:t>Algorithmics Course </a:t>
+            </a:r>
+          </a:p>
+          <a:p>
+            <a:r>
+              <a:rPr lang="en-GB" sz="6000">
                 <a:latin typeface="Lucida Console" panose="020B0609040504020204" pitchFamily="49" charset="0"/>
               </a:rPr>
-              <a:t>, Raid </a:t>
-            </a:r>
-            <a:r>
-              <a:rPr lang="en-GB" sz="6000" dirty="0" err="1" smtClean="0">
-                <a:latin typeface="Lucida Console" panose="020B0609040504020204" pitchFamily="49" charset="0"/>
-              </a:rPr>
-              <a:t>Vellerind</a:t>
-            </a:r>
-            <a:endParaRPr lang="en-GB" sz="6000" dirty="0" smtClean="0">
-              <a:latin typeface="Lucida Console" panose="020B0609040504020204" pitchFamily="49" charset="0"/>
-            </a:endParaRPr>
-          </a:p>
-          <a:p>
-            <a:r>
-              <a:rPr lang="en-GB" sz="6000" dirty="0" smtClean="0">
-                <a:latin typeface="Lucida Console" panose="020B0609040504020204" pitchFamily="49" charset="0"/>
-              </a:rPr>
-              <a:t>University of Tartu</a:t>
-            </a:r>
-          </a:p>
-          <a:p>
-            <a:r>
-              <a:rPr lang="en-GB" sz="6000" dirty="0" err="1" smtClean="0">
-                <a:latin typeface="Lucida Console" panose="020B0609040504020204" pitchFamily="49" charset="0"/>
-              </a:rPr>
-              <a:t>Algorithmics</a:t>
-            </a:r>
-            <a:r>
-              <a:rPr lang="en-GB" sz="6000" dirty="0" smtClean="0">
-                <a:latin typeface="Lucida Console" panose="020B0609040504020204" pitchFamily="49" charset="0"/>
-              </a:rPr>
-              <a:t> Course </a:t>
-            </a:r>
-          </a:p>
-          <a:p>
-            <a:r>
-              <a:rPr lang="en-GB" sz="6000" dirty="0" smtClean="0">
-                <a:latin typeface="Lucida Console" panose="020B0609040504020204" pitchFamily="49" charset="0"/>
-              </a:rPr>
               <a:t>Fall 2018/19</a:t>
             </a:r>
-            <a:endParaRPr lang="en-GB" sz="6000" dirty="0">
-              <a:latin typeface="Lucida Console" panose="020B0609040504020204" pitchFamily="49" charset="0"/>
-            </a:endParaRPr>
           </a:p>
         </p:txBody>
       </p:sp>
@@ -3407,7 +3346,7 @@
         </p:nvSpPr>
         <p:spPr>
           <a:xfrm rot="21092534">
-            <a:off x="1220180" y="36080808"/>
+            <a:off x="1220180" y="35225395"/>
             <a:ext cx="9427839" cy="6001643"/>
           </a:xfrm>
           <a:prstGeom prst="rect">
@@ -3445,24 +3384,15 @@
               <a:buAutoNum type="arabicPeriod"/>
             </a:pPr>
             <a:r>
-              <a:rPr lang="en-GB" sz="3200" dirty="0" err="1">
+              <a:rPr lang="en-GB" sz="3200">
                 <a:solidFill>
                   <a:srgbClr val="000000"/>
                 </a:solidFill>
                 <a:latin typeface="Consolas" panose="020B0609020204030204" pitchFamily="49" charset="0"/>
               </a:rPr>
-              <a:t>solve_sudoku</a:t>
-            </a:r>
-            <a:r>
-              <a:rPr lang="en-GB" sz="3200" dirty="0">
-                <a:solidFill>
-                  <a:srgbClr val="000000"/>
-                </a:solidFill>
-                <a:latin typeface="Consolas" panose="020B0609020204030204" pitchFamily="49" charset="0"/>
-              </a:rPr>
-              <a:t>():  </a:t>
-            </a:r>
-            <a:endParaRPr lang="en-GB" sz="3200" dirty="0">
+              <a:t>solve_sudoku():  </a:t>
+            </a:r>
+            <a:endParaRPr lang="en-GB" sz="3200">
               <a:solidFill>
                 <a:srgbClr val="5C5C5C"/>
               </a:solidFill>
@@ -3475,33 +3405,15 @@
               <a:buAutoNum type="arabicPeriod"/>
             </a:pPr>
             <a:r>
-              <a:rPr lang="en-GB" sz="3200" dirty="0">
+              <a:rPr lang="en-GB" sz="3200">
                 <a:solidFill>
                   <a:srgbClr val="000000"/>
                 </a:solidFill>
                 <a:latin typeface="Consolas" panose="020B0609020204030204" pitchFamily="49" charset="0"/>
               </a:rPr>
-              <a:t>    </a:t>
-            </a:r>
-            <a:r>
-              <a:rPr lang="en-GB" sz="3200" dirty="0" err="1">
-                <a:solidFill>
-                  <a:srgbClr val="000000"/>
-                </a:solidFill>
-                <a:latin typeface="Consolas" panose="020B0609020204030204" pitchFamily="49" charset="0"/>
-              </a:rPr>
-              <a:t>initialise_sudoku</a:t>
-            </a:r>
-            <a:r>
-              <a:rPr lang="en-GB" sz="3200" dirty="0">
-                <a:solidFill>
-                  <a:srgbClr val="000000"/>
-                </a:solidFill>
-                <a:latin typeface="Consolas" panose="020B0609020204030204" pitchFamily="49" charset="0"/>
-              </a:rPr>
-              <a:t>  </a:t>
-            </a:r>
-            <a:endParaRPr lang="en-GB" sz="3200" dirty="0">
+              <a:t>    initialise_sudoku  </a:t>
+            </a:r>
+            <a:endParaRPr lang="en-GB" sz="3200">
               <a:solidFill>
                 <a:srgbClr val="5C5C5C"/>
               </a:solidFill>
@@ -3514,33 +3426,15 @@
               <a:buAutoNum type="arabicPeriod"/>
             </a:pPr>
             <a:r>
-              <a:rPr lang="en-GB" sz="3200" dirty="0">
+              <a:rPr lang="en-GB" sz="3200">
                 <a:solidFill>
                   <a:srgbClr val="000000"/>
                 </a:solidFill>
                 <a:latin typeface="Consolas" panose="020B0609020204030204" pitchFamily="49" charset="0"/>
               </a:rPr>
-              <a:t>    </a:t>
-            </a:r>
-            <a:r>
-              <a:rPr lang="en-GB" sz="3200" dirty="0" err="1">
-                <a:solidFill>
-                  <a:srgbClr val="000000"/>
-                </a:solidFill>
-                <a:latin typeface="Consolas" panose="020B0609020204030204" pitchFamily="49" charset="0"/>
-              </a:rPr>
-              <a:t>constraint_propagation</a:t>
-            </a:r>
-            <a:r>
-              <a:rPr lang="en-GB" sz="3200" dirty="0">
-                <a:solidFill>
-                  <a:srgbClr val="000000"/>
-                </a:solidFill>
-                <a:latin typeface="Consolas" panose="020B0609020204030204" pitchFamily="49" charset="0"/>
-              </a:rPr>
-              <a:t>  </a:t>
-            </a:r>
-            <a:endParaRPr lang="en-GB" sz="3200" dirty="0">
+              <a:t>    constraint_propagation  </a:t>
+            </a:r>
+            <a:endParaRPr lang="en-GB" sz="3200">
               <a:solidFill>
                 <a:srgbClr val="5C5C5C"/>
               </a:solidFill>
@@ -3553,33 +3447,15 @@
               <a:buAutoNum type="arabicPeriod"/>
             </a:pPr>
             <a:r>
-              <a:rPr lang="en-GB" sz="3200" dirty="0">
+              <a:rPr lang="en-GB" sz="3200">
                 <a:solidFill>
                   <a:srgbClr val="000000"/>
                 </a:solidFill>
                 <a:latin typeface="Consolas" panose="020B0609020204030204" pitchFamily="49" charset="0"/>
               </a:rPr>
-              <a:t>    </a:t>
-            </a:r>
-            <a:r>
-              <a:rPr lang="en-GB" sz="3200" dirty="0" err="1">
-                <a:solidFill>
-                  <a:srgbClr val="000000"/>
-                </a:solidFill>
-                <a:latin typeface="Consolas" panose="020B0609020204030204" pitchFamily="49" charset="0"/>
-              </a:rPr>
-              <a:t>initialise_global_pheromones</a:t>
-            </a:r>
-            <a:r>
-              <a:rPr lang="en-GB" sz="3200" dirty="0">
-                <a:solidFill>
-                  <a:srgbClr val="000000"/>
-                </a:solidFill>
-                <a:latin typeface="Consolas" panose="020B0609020204030204" pitchFamily="49" charset="0"/>
-              </a:rPr>
-              <a:t>  </a:t>
-            </a:r>
-            <a:endParaRPr lang="en-GB" sz="3200" dirty="0">
+              <a:t>    initialise_global_pheromones  </a:t>
+            </a:r>
+            <a:endParaRPr lang="en-GB" sz="3200">
               <a:solidFill>
                 <a:srgbClr val="5C5C5C"/>
               </a:solidFill>
@@ -3592,7 +3468,7 @@
               <a:buAutoNum type="arabicPeriod"/>
             </a:pPr>
             <a:r>
-              <a:rPr lang="en-GB" sz="3200" dirty="0">
+              <a:rPr lang="en-GB" sz="3200">
                 <a:solidFill>
                   <a:srgbClr val="000000"/>
                 </a:solidFill>
@@ -3601,7 +3477,7 @@
               <a:t>    </a:t>
             </a:r>
             <a:r>
-              <a:rPr lang="en-GB" sz="3200" b="1" dirty="0">
+              <a:rPr lang="en-GB" sz="3200" b="1">
                 <a:solidFill>
                   <a:srgbClr val="006699"/>
                 </a:solidFill>
@@ -3610,33 +3486,15 @@
               <a:t>while</a:t>
             </a:r>
             <a:r>
-              <a:rPr lang="en-GB" sz="3200" dirty="0">
+              <a:rPr lang="en-GB" sz="3200">
                 <a:solidFill>
                   <a:srgbClr val="000000"/>
                 </a:solidFill>
                 <a:latin typeface="Consolas" panose="020B0609020204030204" pitchFamily="49" charset="0"/>
               </a:rPr>
-              <a:t> </a:t>
-            </a:r>
-            <a:r>
-              <a:rPr lang="en-GB" sz="3200" dirty="0" err="1">
-                <a:solidFill>
-                  <a:srgbClr val="000000"/>
-                </a:solidFill>
-                <a:latin typeface="Consolas" panose="020B0609020204030204" pitchFamily="49" charset="0"/>
-              </a:rPr>
-              <a:t>sudoku</a:t>
-            </a:r>
-            <a:r>
-              <a:rPr lang="en-GB" sz="3200" dirty="0">
-                <a:solidFill>
-                  <a:srgbClr val="000000"/>
-                </a:solidFill>
-                <a:latin typeface="Consolas" panose="020B0609020204030204" pitchFamily="49" charset="0"/>
-              </a:rPr>
-              <a:t> not solved:  </a:t>
-            </a:r>
-            <a:endParaRPr lang="en-GB" sz="3200" dirty="0">
+              <a:t> sudoku not solved:  </a:t>
+            </a:r>
+            <a:endParaRPr lang="en-GB" sz="3200">
               <a:solidFill>
                 <a:srgbClr val="5C5C5C"/>
               </a:solidFill>
@@ -3649,7 +3507,7 @@
               <a:buAutoNum type="arabicPeriod"/>
             </a:pPr>
             <a:r>
-              <a:rPr lang="en-GB" sz="3200" dirty="0">
+              <a:rPr lang="en-GB" sz="3200">
                 <a:solidFill>
                   <a:srgbClr val="000000"/>
                 </a:solidFill>
@@ -3657,7 +3515,7 @@
               </a:rPr>
               <a:t>        generate ants  </a:t>
             </a:r>
-            <a:endParaRPr lang="en-GB" sz="3200" dirty="0">
+            <a:endParaRPr lang="en-GB" sz="3200">
               <a:solidFill>
                 <a:srgbClr val="5C5C5C"/>
               </a:solidFill>
@@ -3670,24 +3528,15 @@
               <a:buAutoNum type="arabicPeriod"/>
             </a:pPr>
             <a:r>
-              <a:rPr lang="en-GB" sz="3200" dirty="0">
+              <a:rPr lang="en-GB" sz="3200">
                 <a:solidFill>
                   <a:srgbClr val="000000"/>
                 </a:solidFill>
                 <a:latin typeface="Consolas" panose="020B0609020204030204" pitchFamily="49" charset="0"/>
               </a:rPr>
-              <a:t>        each ant tries to solve </a:t>
-            </a:r>
-            <a:r>
-              <a:rPr lang="en-GB" sz="3200" dirty="0" err="1" smtClean="0">
-                <a:solidFill>
-                  <a:srgbClr val="000000"/>
-                </a:solidFill>
-                <a:latin typeface="Consolas" panose="020B0609020204030204" pitchFamily="49" charset="0"/>
-              </a:rPr>
-              <a:t>sudoku</a:t>
-            </a:r>
-            <a:endParaRPr lang="en-GB" sz="3200" dirty="0">
+              <a:t>        each ant tries to solve sudoku</a:t>
+            </a:r>
+            <a:endParaRPr lang="en-GB" sz="3200">
               <a:solidFill>
                 <a:srgbClr val="5C5C5C"/>
               </a:solidFill>
@@ -3700,7 +3549,7 @@
               <a:buAutoNum type="arabicPeriod"/>
             </a:pPr>
             <a:r>
-              <a:rPr lang="en-GB" sz="3200" dirty="0">
+              <a:rPr lang="en-GB" sz="3200">
                 <a:solidFill>
                   <a:srgbClr val="000000"/>
                 </a:solidFill>
@@ -3708,7 +3557,7 @@
               </a:rPr>
               <a:t>        find best ant  </a:t>
             </a:r>
-            <a:endParaRPr lang="en-GB" sz="3200" dirty="0">
+            <a:endParaRPr lang="en-GB" sz="3200">
               <a:solidFill>
                 <a:srgbClr val="5C5C5C"/>
               </a:solidFill>
@@ -3721,7 +3570,7 @@
               <a:buAutoNum type="arabicPeriod"/>
             </a:pPr>
             <a:r>
-              <a:rPr lang="en-GB" sz="3200" dirty="0">
+              <a:rPr lang="en-GB" sz="3200">
                 <a:solidFill>
                   <a:srgbClr val="000000"/>
                 </a:solidFill>
@@ -3729,7 +3578,7 @@
               </a:rPr>
               <a:t>        update global pheromones  </a:t>
             </a:r>
-            <a:endParaRPr lang="en-GB" sz="3200" dirty="0">
+            <a:endParaRPr lang="en-GB" sz="3200">
               <a:solidFill>
                 <a:srgbClr val="5C5C5C"/>
               </a:solidFill>
@@ -3742,7 +3591,7 @@
               <a:buAutoNum type="arabicPeriod"/>
             </a:pPr>
             <a:r>
-              <a:rPr lang="en-GB" sz="3200" dirty="0">
+              <a:rPr lang="en-GB" sz="3200">
                 <a:solidFill>
                   <a:srgbClr val="000000"/>
                 </a:solidFill>
@@ -3751,7 +3600,7 @@
               <a:t>        </a:t>
             </a:r>
             <a:r>
-              <a:rPr lang="en-GB" sz="3200" b="1" dirty="0">
+              <a:rPr lang="en-GB" sz="3200" b="1">
                 <a:solidFill>
                   <a:srgbClr val="006699"/>
                 </a:solidFill>
@@ -3760,7 +3609,7 @@
               <a:t>if</a:t>
             </a:r>
             <a:r>
-              <a:rPr lang="en-GB" sz="3200" dirty="0">
+              <a:rPr lang="en-GB" sz="3200">
                 <a:solidFill>
                   <a:srgbClr val="000000"/>
                 </a:solidFill>
@@ -3768,7 +3617,7 @@
               </a:rPr>
               <a:t> best ant has solution  </a:t>
             </a:r>
-            <a:endParaRPr lang="en-GB" sz="3200" dirty="0">
+            <a:endParaRPr lang="en-GB" sz="3200">
               <a:solidFill>
                 <a:srgbClr val="5C5C5C"/>
               </a:solidFill>
@@ -3781,7 +3630,7 @@
               <a:buAutoNum type="arabicPeriod"/>
             </a:pPr>
             <a:r>
-              <a:rPr lang="en-GB" sz="3200" dirty="0">
+              <a:rPr lang="en-GB" sz="3200">
                 <a:solidFill>
                   <a:srgbClr val="000000"/>
                 </a:solidFill>
@@ -3790,7 +3639,7 @@
               <a:t>            </a:t>
             </a:r>
             <a:r>
-              <a:rPr lang="en-GB" sz="3200" b="1" dirty="0">
+              <a:rPr lang="en-GB" sz="3200" b="1">
                 <a:solidFill>
                   <a:srgbClr val="006699"/>
                 </a:solidFill>
@@ -3799,7 +3648,7 @@
               <a:t>break</a:t>
             </a:r>
             <a:r>
-              <a:rPr lang="en-GB" sz="3200" dirty="0">
+              <a:rPr lang="en-GB" sz="3200">
                 <a:solidFill>
                   <a:srgbClr val="000000"/>
                 </a:solidFill>
@@ -3807,7 +3656,7 @@
               </a:rPr>
               <a:t>  </a:t>
             </a:r>
-            <a:endParaRPr lang="en-GB" sz="3200" dirty="0">
+            <a:endParaRPr lang="en-GB" sz="3200">
               <a:solidFill>
                 <a:srgbClr val="5C5C5C"/>
               </a:solidFill>
@@ -3820,7 +3669,7 @@
               <a:buAutoNum type="arabicPeriod"/>
             </a:pPr>
             <a:r>
-              <a:rPr lang="en-GB" sz="3200" dirty="0">
+              <a:rPr lang="en-GB" sz="3200">
                 <a:solidFill>
                   <a:srgbClr val="000000"/>
                 </a:solidFill>
@@ -3829,7 +3678,7 @@
               <a:t>    </a:t>
             </a:r>
             <a:r>
-              <a:rPr lang="en-GB" sz="3200" b="1" dirty="0">
+              <a:rPr lang="en-GB" sz="3200" b="1">
                 <a:solidFill>
                   <a:srgbClr val="006699"/>
                 </a:solidFill>
@@ -3838,33 +3687,15 @@
               <a:t>return</a:t>
             </a:r>
             <a:r>
-              <a:rPr lang="en-GB" sz="3200" dirty="0">
+              <a:rPr lang="en-GB" sz="3200">
                 <a:solidFill>
                   <a:srgbClr val="000000"/>
                 </a:solidFill>
                 <a:latin typeface="Consolas" panose="020B0609020204030204" pitchFamily="49" charset="0"/>
               </a:rPr>
-              <a:t> solved </a:t>
-            </a:r>
-            <a:r>
-              <a:rPr lang="en-GB" sz="3200" dirty="0" err="1">
-                <a:solidFill>
-                  <a:srgbClr val="000000"/>
-                </a:solidFill>
-                <a:latin typeface="Consolas" panose="020B0609020204030204" pitchFamily="49" charset="0"/>
-              </a:rPr>
-              <a:t>sudoku</a:t>
-            </a:r>
-            <a:r>
-              <a:rPr lang="en-GB" sz="3200" dirty="0">
-                <a:solidFill>
-                  <a:srgbClr val="000000"/>
-                </a:solidFill>
-                <a:latin typeface="Consolas" panose="020B0609020204030204" pitchFamily="49" charset="0"/>
-              </a:rPr>
-              <a:t> </a:t>
-            </a:r>
-            <a:endParaRPr lang="en-GB" sz="3200" b="0" i="0" dirty="0">
+              <a:t> solved sudoku </a:t>
+            </a:r>
+            <a:endParaRPr lang="en-GB" sz="3200" b="0" i="0">
               <a:solidFill>
                 <a:srgbClr val="5C5C5C"/>
               </a:solidFill>
@@ -3874,36 +3705,6 @@
           </a:p>
         </p:txBody>
       </p:sp>
-      <p:pic>
-        <p:nvPicPr>
-          <p:cNvPr id="10" name="Picture 9"/>
-          <p:cNvPicPr>
-            <a:picLocks noChangeAspect="1"/>
-          </p:cNvPicPr>
-          <p:nvPr/>
-        </p:nvPicPr>
-        <p:blipFill>
-          <a:blip r:embed="rId4">
-            <a:extLst>
-              <a:ext uri="{28A0092B-C50C-407E-A947-70E740481C1C}">
-                <a14:useLocalDpi xmlns:a14="http://schemas.microsoft.com/office/drawing/2010/main" val="0"/>
-              </a:ext>
-            </a:extLst>
-          </a:blip>
-          <a:stretch>
-            <a:fillRect/>
-          </a:stretch>
-        </p:blipFill>
-        <p:spPr>
-          <a:xfrm rot="1262859">
-            <a:off x="24306484" y="27433054"/>
-            <a:ext cx="5720191" cy="5720191"/>
-          </a:xfrm>
-          <a:prstGeom prst="rect">
-            <a:avLst/>
-          </a:prstGeom>
-        </p:spPr>
-      </p:pic>
       <p:sp>
         <p:nvSpPr>
           <p:cNvPr id="7" name="Rectangle 6"/>
@@ -3912,7 +3713,7 @@
         </p:nvSpPr>
         <p:spPr>
           <a:xfrm>
-            <a:off x="19006456" y="33276952"/>
+            <a:off x="19006456" y="33099970"/>
             <a:ext cx="10811233" cy="5016758"/>
           </a:xfrm>
           <a:prstGeom prst="rect">
@@ -4004,25 +3805,7 @@
                 </a:solidFill>
                 <a:latin typeface="Consolas" panose="020B0609020204030204" pitchFamily="49" charset="0"/>
               </a:rPr>
-              <a:t> changes in </a:t>
-            </a:r>
-            <a:r>
-              <a:rPr lang="en-GB" sz="3200" dirty="0" err="1">
-                <a:solidFill>
-                  <a:srgbClr val="000000"/>
-                </a:solidFill>
-                <a:latin typeface="Consolas" panose="020B0609020204030204" pitchFamily="49" charset="0"/>
-              </a:rPr>
-              <a:t>sudoku</a:t>
-            </a:r>
-            <a:r>
-              <a:rPr lang="en-GB" sz="3200" dirty="0">
-                <a:solidFill>
-                  <a:srgbClr val="000000"/>
-                </a:solidFill>
-                <a:latin typeface="Consolas" panose="020B0609020204030204" pitchFamily="49" charset="0"/>
-              </a:rPr>
-              <a:t>:  </a:t>
+              <a:t> changes in sudoku:  </a:t>
             </a:r>
             <a:endParaRPr lang="en-GB" sz="3200" dirty="0">
               <a:solidFill>
@@ -4043,25 +3826,7 @@
                 </a:solidFill>
                 <a:latin typeface="Consolas" panose="020B0609020204030204" pitchFamily="49" charset="0"/>
               </a:rPr>
-              <a:t>        </a:t>
-            </a:r>
-            <a:r>
-              <a:rPr lang="en-GB" sz="3200" dirty="0" smtClean="0">
-                <a:solidFill>
-                  <a:srgbClr val="000000"/>
-                </a:solidFill>
-                <a:latin typeface="Consolas" panose="020B0609020204030204" pitchFamily="49" charset="0"/>
-              </a:rPr>
-              <a:t>Eliminate</a:t>
-            </a:r>
-            <a:r>
-              <a:rPr lang="en-GB" sz="3200" dirty="0">
-                <a:solidFill>
-                  <a:srgbClr val="000000"/>
-                </a:solidFill>
-                <a:latin typeface="Consolas" panose="020B0609020204030204" pitchFamily="49" charset="0"/>
-              </a:rPr>
-              <a:t> from a cell’s value   </a:t>
+              <a:t>        Eliminate from a cell’s value   </a:t>
             </a:r>
             <a:endParaRPr lang="en-GB" sz="3200" dirty="0">
               <a:solidFill>
@@ -4124,25 +3889,7 @@
                 </a:solidFill>
                 <a:latin typeface="Consolas" panose="020B0609020204030204" pitchFamily="49" charset="0"/>
               </a:rPr>
-              <a:t>        </a:t>
-            </a:r>
-            <a:r>
-              <a:rPr lang="en-GB" sz="3200" dirty="0" smtClean="0">
-                <a:solidFill>
-                  <a:srgbClr val="000000"/>
-                </a:solidFill>
-                <a:latin typeface="Consolas" panose="020B0609020204030204" pitchFamily="49" charset="0"/>
-              </a:rPr>
-              <a:t>If</a:t>
-            </a:r>
-            <a:r>
-              <a:rPr lang="en-GB" sz="3200" dirty="0">
-                <a:solidFill>
-                  <a:srgbClr val="000000"/>
-                </a:solidFill>
-                <a:latin typeface="Consolas" panose="020B0609020204030204" pitchFamily="49" charset="0"/>
-              </a:rPr>
-              <a:t> any values in a cell’s value   </a:t>
+              <a:t>        If any values in a cell’s value   </a:t>
             </a:r>
             <a:endParaRPr lang="en-GB" sz="3200" dirty="0">
               <a:solidFill>
@@ -4184,16 +3931,7 @@
                 </a:solidFill>
                 <a:latin typeface="Consolas" panose="020B0609020204030204" pitchFamily="49" charset="0"/>
               </a:rPr>
-              <a:t>            place in any of the cell’s units</a:t>
-            </a:r>
-            <a:r>
-              <a:rPr lang="en-GB" sz="3200" dirty="0" smtClean="0">
-                <a:solidFill>
-                  <a:srgbClr val="000000"/>
-                </a:solidFill>
-                <a:latin typeface="Consolas" panose="020B0609020204030204" pitchFamily="49" charset="0"/>
-              </a:rPr>
-              <a:t>,</a:t>
+              <a:t>            place in any of the cell’s units,</a:t>
             </a:r>
             <a:endParaRPr lang="en-GB" sz="3200" dirty="0">
               <a:solidFill>
@@ -4253,25 +3991,7 @@
                 </a:solidFill>
                 <a:latin typeface="Consolas" panose="020B0609020204030204" pitchFamily="49" charset="0"/>
               </a:rPr>
-              <a:t> changed </a:t>
-            </a:r>
-            <a:r>
-              <a:rPr lang="en-GB" sz="3200" dirty="0" err="1">
-                <a:solidFill>
-                  <a:srgbClr val="000000"/>
-                </a:solidFill>
-                <a:latin typeface="Consolas" panose="020B0609020204030204" pitchFamily="49" charset="0"/>
-              </a:rPr>
-              <a:t>sudoku</a:t>
-            </a:r>
-            <a:r>
-              <a:rPr lang="en-GB" sz="3200" dirty="0">
-                <a:solidFill>
-                  <a:srgbClr val="000000"/>
-                </a:solidFill>
-                <a:latin typeface="Consolas" panose="020B0609020204030204" pitchFamily="49" charset="0"/>
-              </a:rPr>
-              <a:t>  </a:t>
+              <a:t> changed sudoku  </a:t>
             </a:r>
             <a:endParaRPr lang="en-GB" sz="3200" b="0" i="0" dirty="0">
               <a:solidFill>
@@ -4292,7 +4012,7 @@
         <p:spPr>
           <a:xfrm>
             <a:off x="11332029" y="27237670"/>
-            <a:ext cx="13683342" cy="5632311"/>
+            <a:ext cx="13683342" cy="5078313"/>
           </a:xfrm>
           <a:prstGeom prst="rect">
             <a:avLst/>
@@ -4306,7 +4026,7 @@
           <a:lstStyle/>
           <a:p>
             <a:r>
-              <a:rPr lang="en-GB" sz="4000" dirty="0" smtClean="0">
+              <a:rPr lang="en-GB" sz="3600" dirty="0">
                 <a:latin typeface="Lucida Console" panose="020B0609040504020204" pitchFamily="49" charset="0"/>
               </a:rPr>
               <a:t>    Constraint propagation is a method that </a:t>
@@ -4314,62 +4034,236 @@
           </a:p>
           <a:p>
             <a:r>
-              <a:rPr lang="en-GB" sz="4000" dirty="0">
+              <a:rPr lang="en-GB" sz="3600" dirty="0">
                 <a:latin typeface="Lucida Console" panose="020B0609040504020204" pitchFamily="49" charset="0"/>
               </a:rPr>
-              <a:t> </a:t>
-            </a:r>
-            <a:r>
-              <a:rPr lang="en-GB" sz="4000" dirty="0" smtClean="0">
+              <a:t>  fills in all the “obvious” cells. For this </a:t>
+            </a:r>
+          </a:p>
+          <a:p>
+            <a:r>
+              <a:rPr lang="en-GB" sz="3600" dirty="0">
                 <a:latin typeface="Lucida Console" panose="020B0609040504020204" pitchFamily="49" charset="0"/>
               </a:rPr>
-              <a:t> fills in all the “obvious” cells. For </a:t>
-            </a:r>
-          </a:p>
-          <a:p>
-            <a:r>
-              <a:rPr lang="en-GB" sz="4000" dirty="0" smtClean="0">
+              <a:t>the peers of a cell are checked. Any cell has exactly three units and 20 peers. The three units are row, column and box. The set of </a:t>
+            </a:r>
+          </a:p>
+          <a:p>
+            <a:r>
+              <a:rPr lang="en-GB" sz="3600" dirty="0">
                 <a:latin typeface="Lucida Console" panose="020B0609040504020204" pitchFamily="49" charset="0"/>
               </a:rPr>
-              <a:t>this the peers of a cell are checked. Any cell has exactly three units and 20 peers. The three units are row, column and box. </a:t>
-            </a:r>
-          </a:p>
-          <a:p>
-            <a:r>
-              <a:rPr lang="en-GB" sz="4000" dirty="0" smtClean="0">
+              <a:t>peers is made up of the cells containing in units. For easier Sudokus, constraint propagation is enough to solve the whole </a:t>
+            </a:r>
+          </a:p>
+          <a:p>
+            <a:r>
+              <a:rPr lang="en-GB" sz="3600" dirty="0">
                 <a:latin typeface="Lucida Console" panose="020B0609040504020204" pitchFamily="49" charset="0"/>
               </a:rPr>
-              <a:t>The set of peers is made up of the cells containing in units. For easier </a:t>
-            </a:r>
-            <a:r>
-              <a:rPr lang="en-GB" sz="4000" dirty="0" err="1" smtClean="0">
-                <a:latin typeface="Lucida Console" panose="020B0609040504020204" pitchFamily="49" charset="0"/>
-              </a:rPr>
-              <a:t>Sudokus</a:t>
-            </a:r>
-            <a:r>
-              <a:rPr lang="en-GB" sz="4000" dirty="0" smtClean="0">
-                <a:latin typeface="Lucida Console" panose="020B0609040504020204" pitchFamily="49" charset="0"/>
-              </a:rPr>
-              <a:t>, constraint propagation is enough to </a:t>
-            </a:r>
-          </a:p>
-          <a:p>
-            <a:r>
-              <a:rPr lang="en-GB" sz="4000" dirty="0" smtClean="0">
-                <a:latin typeface="Lucida Console" panose="020B0609040504020204" pitchFamily="49" charset="0"/>
-              </a:rPr>
-              <a:t>solve the whole Sudoku. </a:t>
-            </a:r>
-            <a:endParaRPr lang="en-GB" sz="4000" dirty="0">
-              <a:latin typeface="Lucida Console" panose="020B0609040504020204" pitchFamily="49" charset="0"/>
-            </a:endParaRPr>
+              <a:t>Sudoku. </a:t>
+            </a:r>
           </a:p>
         </p:txBody>
       </p:sp>
       <p:pic>
         <p:nvPicPr>
           <p:cNvPr id="13" name="Picture 12"/>
+          <p:cNvPicPr>
+            <a:picLocks noChangeAspect="1"/>
+          </p:cNvPicPr>
+          <p:nvPr/>
+        </p:nvPicPr>
+        <p:blipFill>
+          <a:blip r:embed="rId4">
+            <a:extLst>
+              <a:ext uri="{28A0092B-C50C-407E-A947-70E740481C1C}">
+                <a14:useLocalDpi xmlns:a14="http://schemas.microsoft.com/office/drawing/2010/main" val="0"/>
+              </a:ext>
+            </a:extLst>
+          </a:blip>
+          <a:stretch>
+            <a:fillRect/>
+          </a:stretch>
+        </p:blipFill>
+        <p:spPr>
+          <a:xfrm rot="21233483">
+            <a:off x="253226" y="15124453"/>
+            <a:ext cx="5111220" cy="5031994"/>
+          </a:xfrm>
+          <a:prstGeom prst="rect">
+            <a:avLst/>
+          </a:prstGeom>
+          <a:solidFill>
+            <a:schemeClr val="bg1"/>
+          </a:solidFill>
+        </p:spPr>
+      </p:pic>
+      <p:sp>
+        <p:nvSpPr>
+          <p:cNvPr id="14" name="TextBox 13"/>
+          <p:cNvSpPr txBox="1"/>
+          <p:nvPr/>
+        </p:nvSpPr>
+        <p:spPr>
+          <a:xfrm>
+            <a:off x="1246044" y="16876370"/>
+            <a:ext cx="11754660" cy="7848302"/>
+          </a:xfrm>
+          <a:prstGeom prst="rect">
+            <a:avLst/>
+          </a:prstGeom>
+          <a:noFill/>
+        </p:spPr>
+        <p:txBody>
+          <a:bodyPr wrap="square" rtlCol="0">
+            <a:spAutoFit/>
+          </a:bodyPr>
+          <a:lstStyle/>
+          <a:p>
+            <a:pPr algn="just"/>
+            <a:r>
+              <a:rPr lang="en-GB" sz="3600" dirty="0">
+                <a:latin typeface="Lucida Console" panose="020B0609040504020204" pitchFamily="49" charset="0"/>
+              </a:rPr>
+              <a:t>                Global pheromone table is 	   initialised with default 	   probability for each 	 	   possible value in given 	   cells value set. After 	   every generation, the global pheromone table is updated based on the findings of “best ant” and all of the pheromone values are increased. The „best ant“ is an ant who got the most cells fixed in a generation but did not find a correct solution. Over gene-rations, pheromones for wrong values get decreased. </a:t>
+            </a:r>
+          </a:p>
+        </p:txBody>
+      </p:sp>
+      <p:sp>
+        <p:nvSpPr>
+          <p:cNvPr id="15" name="TextBox 14"/>
+          <p:cNvSpPr txBox="1"/>
+          <p:nvPr/>
+        </p:nvSpPr>
+        <p:spPr>
+          <a:xfrm>
+            <a:off x="1098559" y="8854187"/>
+            <a:ext cx="11843151" cy="5078313"/>
+          </a:xfrm>
+          <a:prstGeom prst="rect">
+            <a:avLst/>
+          </a:prstGeom>
+          <a:noFill/>
+        </p:spPr>
+        <p:txBody>
+          <a:bodyPr wrap="square" rtlCol="0">
+            <a:spAutoFit/>
+          </a:bodyPr>
+          <a:lstStyle/>
+          <a:p>
+            <a:pPr algn="just"/>
+            <a:r>
+              <a:rPr lang="en-GB" sz="3600">
+                <a:latin typeface="Lucida Console" panose="020B0609040504020204" pitchFamily="49" charset="0"/>
+              </a:rPr>
+              <a:t>Solving a sudoku is a NP-complete problem. There are multiple possible ways to solving a sudoku and one of them is ant colony optimization. For solving Sudokus with ant colonies, we give each ant a copy of the Sudoku and let them randomly guess which value should be in which cell. Most ants will be drawn towards the best solution by global pheromone trail.</a:t>
+            </a:r>
+          </a:p>
+        </p:txBody>
+      </p:sp>
+      <p:sp>
+        <p:nvSpPr>
+          <p:cNvPr id="16" name="TextBox 15"/>
+          <p:cNvSpPr txBox="1"/>
+          <p:nvPr/>
+        </p:nvSpPr>
+        <p:spPr>
+          <a:xfrm>
+            <a:off x="1246046" y="26280394"/>
+            <a:ext cx="9792070" cy="8956298"/>
+          </a:xfrm>
+          <a:prstGeom prst="rect">
+            <a:avLst/>
+          </a:prstGeom>
+          <a:noFill/>
+        </p:spPr>
+        <p:txBody>
+          <a:bodyPr wrap="square" rtlCol="0">
+            <a:spAutoFit/>
+          </a:bodyPr>
+          <a:lstStyle/>
+          <a:p>
+            <a:pPr algn="just"/>
+            <a:r>
+              <a:rPr lang="en-GB" sz="3600" dirty="0">
+                <a:latin typeface="Lucida Console" panose="020B0609040504020204" pitchFamily="49" charset="0"/>
+              </a:rPr>
+              <a:t>Each ant starts its </a:t>
+            </a:r>
+          </a:p>
+          <a:p>
+            <a:pPr algn="just"/>
+            <a:r>
+              <a:rPr lang="en-GB" sz="3600" dirty="0">
+                <a:latin typeface="Lucida Console" panose="020B0609040504020204" pitchFamily="49" charset="0"/>
+              </a:rPr>
+              <a:t>journey from a random </a:t>
+            </a:r>
+          </a:p>
+          <a:p>
+            <a:pPr algn="just"/>
+            <a:r>
+              <a:rPr lang="en-GB" sz="3600" dirty="0">
+                <a:latin typeface="Lucida Console" panose="020B0609040504020204" pitchFamily="49" charset="0"/>
+              </a:rPr>
+              <a:t>cell. If the cell’s </a:t>
+            </a:r>
+          </a:p>
+          <a:p>
+            <a:pPr algn="just"/>
+            <a:r>
+              <a:rPr lang="en-GB" sz="3600" dirty="0">
+                <a:latin typeface="Lucida Console" panose="020B0609040504020204" pitchFamily="49" charset="0"/>
+              </a:rPr>
+              <a:t>value is not fixed, </a:t>
+            </a:r>
+          </a:p>
+          <a:p>
+            <a:pPr algn="just"/>
+            <a:r>
+              <a:rPr lang="en-GB" sz="3600" dirty="0">
+                <a:latin typeface="Lucida Console" panose="020B0609040504020204" pitchFamily="49" charset="0"/>
+              </a:rPr>
+              <a:t>the ant will make a </a:t>
+            </a:r>
+          </a:p>
+          <a:p>
+            <a:pPr algn="just"/>
+            <a:r>
+              <a:rPr lang="en-GB" sz="3600" dirty="0">
+                <a:latin typeface="Lucida Console" panose="020B0609040504020204" pitchFamily="49" charset="0"/>
+              </a:rPr>
+              <a:t>weighed random</a:t>
+            </a:r>
+            <a:r>
+              <a:rPr lang="et-EE" sz="3600" dirty="0">
+                <a:latin typeface="Lucida Console" panose="020B0609040504020204" pitchFamily="49" charset="0"/>
+              </a:rPr>
+              <a:t> </a:t>
+            </a:r>
+            <a:r>
+              <a:rPr lang="en-GB" sz="3600" dirty="0">
+                <a:latin typeface="Lucida Console" panose="020B0609040504020204" pitchFamily="49" charset="0"/>
+              </a:rPr>
+              <a:t>decision based </a:t>
+            </a:r>
+          </a:p>
+          <a:p>
+            <a:pPr algn="just"/>
+            <a:r>
+              <a:rPr lang="en-GB" sz="3600" dirty="0">
+                <a:latin typeface="Lucida Console" panose="020B0609040504020204" pitchFamily="49" charset="0"/>
+              </a:rPr>
+              <a:t>on the pheromone table. After that, constraint propagation is applied to the Sudoku to determine what effect the ant’s decision had on the whole Sudoku. Then the ant lowers the pheromone level for next generation. That way, if the ant does not find a solution, other ants will choose it at a lower probability.</a:t>
+            </a:r>
+          </a:p>
+        </p:txBody>
+      </p:sp>
+      <p:pic>
+        <p:nvPicPr>
+          <p:cNvPr id="10" name="Picture 9"/>
           <p:cNvPicPr>
             <a:picLocks noChangeAspect="1"/>
           </p:cNvPicPr>
@@ -4388,261 +4282,16 @@
           </a:stretch>
         </p:blipFill>
         <p:spPr>
-          <a:xfrm rot="21233483">
-            <a:off x="253226" y="15124453"/>
-            <a:ext cx="5111220" cy="5031994"/>
-          </a:xfrm>
-          <a:prstGeom prst="rect">
-            <a:avLst/>
-          </a:prstGeom>
-        </p:spPr>
-      </p:pic>
-      <p:sp>
-        <p:nvSpPr>
-          <p:cNvPr id="14" name="TextBox 13"/>
-          <p:cNvSpPr txBox="1"/>
-          <p:nvPr/>
-        </p:nvSpPr>
-        <p:spPr>
-          <a:xfrm>
-            <a:off x="1246044" y="16197943"/>
-            <a:ext cx="11784155" cy="8710077"/>
+          <a:xfrm rot="1262859">
+            <a:off x="24306484" y="27433054"/>
+            <a:ext cx="5720191" cy="5720191"/>
           </a:xfrm>
           <a:prstGeom prst="rect">
             <a:avLst/>
           </a:prstGeom>
           <a:noFill/>
         </p:spPr>
-        <p:txBody>
-          <a:bodyPr wrap="square" rtlCol="0">
-            <a:spAutoFit/>
-          </a:bodyPr>
-          <a:lstStyle/>
-          <a:p>
-            <a:r>
-              <a:rPr lang="en-GB" sz="4000" dirty="0" smtClean="0">
-                <a:latin typeface="Lucida Console" panose="020B0609040504020204" pitchFamily="49" charset="0"/>
-              </a:rPr>
-              <a:t>             Global pheromone map is</a:t>
-            </a:r>
-          </a:p>
-          <a:p>
-            <a:r>
-              <a:rPr lang="en-GB" sz="4000" dirty="0" smtClean="0">
-                <a:latin typeface="Lucida Console" panose="020B0609040504020204" pitchFamily="49" charset="0"/>
-              </a:rPr>
-              <a:t>             initialised with default</a:t>
-            </a:r>
-          </a:p>
-          <a:p>
-            <a:r>
-              <a:rPr lang="en-GB" sz="4000" dirty="0" smtClean="0">
-                <a:latin typeface="Lucida Console" panose="020B0609040504020204" pitchFamily="49" charset="0"/>
-              </a:rPr>
-              <a:t>              probability for each </a:t>
-            </a:r>
-          </a:p>
-          <a:p>
-            <a:r>
-              <a:rPr lang="en-GB" sz="4000" dirty="0">
-                <a:latin typeface="Lucida Console" panose="020B0609040504020204" pitchFamily="49" charset="0"/>
-              </a:rPr>
-              <a:t> </a:t>
-            </a:r>
-            <a:r>
-              <a:rPr lang="en-GB" sz="4000" dirty="0" smtClean="0">
-                <a:latin typeface="Lucida Console" panose="020B0609040504020204" pitchFamily="49" charset="0"/>
-              </a:rPr>
-              <a:t>             value in given cell’s</a:t>
-            </a:r>
-          </a:p>
-          <a:p>
-            <a:r>
-              <a:rPr lang="en-GB" sz="4000" dirty="0" smtClean="0">
-                <a:latin typeface="Lucida Console" panose="020B0609040504020204" pitchFamily="49" charset="0"/>
-              </a:rPr>
-              <a:t>              value set. With every</a:t>
-            </a:r>
-          </a:p>
-          <a:p>
-            <a:r>
-              <a:rPr lang="en-GB" sz="4000" dirty="0" smtClean="0">
-                <a:latin typeface="Lucida Console" panose="020B0609040504020204" pitchFamily="49" charset="0"/>
-              </a:rPr>
-              <a:t>              generation the global </a:t>
-            </a:r>
-          </a:p>
-          <a:p>
-            <a:r>
-              <a:rPr lang="en-GB" sz="4000" dirty="0">
-                <a:latin typeface="Lucida Console" panose="020B0609040504020204" pitchFamily="49" charset="0"/>
-              </a:rPr>
-              <a:t> </a:t>
-            </a:r>
-            <a:r>
-              <a:rPr lang="en-GB" sz="4000" dirty="0" smtClean="0">
-                <a:latin typeface="Lucida Console" panose="020B0609040504020204" pitchFamily="49" charset="0"/>
-              </a:rPr>
-              <a:t>         pheromone value is updated based on the findings of “best ant.” The cell value will most probably be the one with the highest pheromone level. If for any cell the pheromone level has not changed from default, the choice for a suitable value is made randomly.</a:t>
-            </a:r>
-            <a:endParaRPr lang="en-GB" sz="4000" dirty="0">
-              <a:latin typeface="Lucida Console" panose="020B0609040504020204" pitchFamily="49" charset="0"/>
-            </a:endParaRPr>
-          </a:p>
-        </p:txBody>
-      </p:sp>
-      <p:sp>
-        <p:nvSpPr>
-          <p:cNvPr id="15" name="TextBox 14"/>
-          <p:cNvSpPr txBox="1"/>
-          <p:nvPr/>
-        </p:nvSpPr>
-        <p:spPr>
-          <a:xfrm>
-            <a:off x="1246045" y="9407022"/>
-            <a:ext cx="11784155" cy="4401205"/>
-          </a:xfrm>
-          <a:prstGeom prst="rect">
-            <a:avLst/>
-          </a:prstGeom>
-          <a:noFill/>
-        </p:spPr>
-        <p:txBody>
-          <a:bodyPr wrap="square" rtlCol="0">
-            <a:spAutoFit/>
-          </a:bodyPr>
-          <a:lstStyle/>
-          <a:p>
-            <a:r>
-              <a:rPr lang="en-GB" sz="4000" dirty="0" smtClean="0">
-                <a:latin typeface="Lucida Console" panose="020B0609040504020204" pitchFamily="49" charset="0"/>
-              </a:rPr>
-              <a:t>For solving </a:t>
-            </a:r>
-            <a:r>
-              <a:rPr lang="en-GB" sz="4000" dirty="0" err="1" smtClean="0">
-                <a:latin typeface="Lucida Console" panose="020B0609040504020204" pitchFamily="49" charset="0"/>
-              </a:rPr>
-              <a:t>Sudokus</a:t>
-            </a:r>
-            <a:r>
-              <a:rPr lang="en-GB" sz="4000" dirty="0" smtClean="0">
-                <a:latin typeface="Lucida Console" panose="020B0609040504020204" pitchFamily="49" charset="0"/>
-              </a:rPr>
-              <a:t> with ant colony optimisation, we give each ant a copy of the Sudoku and let them randomly guess witch value should be in which cell. Most ants will be drawn towards the best solution by global pheromone trail.</a:t>
-            </a:r>
-            <a:endParaRPr lang="en-GB" sz="4000" dirty="0">
-              <a:latin typeface="Lucida Console" panose="020B0609040504020204" pitchFamily="49" charset="0"/>
-            </a:endParaRPr>
-          </a:p>
-        </p:txBody>
-      </p:sp>
-      <p:sp>
-        <p:nvSpPr>
-          <p:cNvPr id="16" name="TextBox 15"/>
-          <p:cNvSpPr txBox="1"/>
-          <p:nvPr/>
-        </p:nvSpPr>
-        <p:spPr>
-          <a:xfrm>
-            <a:off x="1246045" y="25844148"/>
-            <a:ext cx="9792070" cy="9941183"/>
-          </a:xfrm>
-          <a:prstGeom prst="rect">
-            <a:avLst/>
-          </a:prstGeom>
-          <a:noFill/>
-        </p:spPr>
-        <p:txBody>
-          <a:bodyPr wrap="square" rtlCol="0">
-            <a:spAutoFit/>
-          </a:bodyPr>
-          <a:lstStyle/>
-          <a:p>
-            <a:r>
-              <a:rPr lang="en-GB" sz="4000" dirty="0" smtClean="0">
-                <a:latin typeface="Lucida Console" panose="020B0609040504020204" pitchFamily="49" charset="0"/>
-              </a:rPr>
-              <a:t>Each ant starts </a:t>
-            </a:r>
-          </a:p>
-          <a:p>
-            <a:r>
-              <a:rPr lang="en-GB" sz="4000" dirty="0" smtClean="0">
-                <a:latin typeface="Lucida Console" panose="020B0609040504020204" pitchFamily="49" charset="0"/>
-              </a:rPr>
-              <a:t>its journey from a </a:t>
-            </a:r>
-          </a:p>
-          <a:p>
-            <a:r>
-              <a:rPr lang="en-GB" sz="4000" dirty="0" smtClean="0">
-                <a:latin typeface="Lucida Console" panose="020B0609040504020204" pitchFamily="49" charset="0"/>
-              </a:rPr>
-              <a:t>random cell. If the </a:t>
-            </a:r>
-          </a:p>
-          <a:p>
-            <a:r>
-              <a:rPr lang="en-GB" sz="4000" dirty="0" smtClean="0">
-                <a:latin typeface="Lucida Console" panose="020B0609040504020204" pitchFamily="49" charset="0"/>
-              </a:rPr>
-              <a:t>cell’s value is not </a:t>
-            </a:r>
-          </a:p>
-          <a:p>
-            <a:r>
-              <a:rPr lang="en-GB" sz="4000" dirty="0" smtClean="0">
-                <a:latin typeface="Lucida Console" panose="020B0609040504020204" pitchFamily="49" charset="0"/>
-              </a:rPr>
-              <a:t>fixed, the ant will </a:t>
-            </a:r>
-          </a:p>
-          <a:p>
-            <a:r>
-              <a:rPr lang="en-GB" sz="4000" dirty="0" smtClean="0">
-                <a:latin typeface="Lucida Console" panose="020B0609040504020204" pitchFamily="49" charset="0"/>
-              </a:rPr>
-              <a:t>make a weighed decision </a:t>
-            </a:r>
-          </a:p>
-          <a:p>
-            <a:r>
-              <a:rPr lang="en-GB" sz="4000" dirty="0" smtClean="0">
-                <a:latin typeface="Lucida Console" panose="020B0609040504020204" pitchFamily="49" charset="0"/>
-              </a:rPr>
-              <a:t>based on the </a:t>
-            </a:r>
-            <a:r>
-              <a:rPr lang="en-GB" sz="4000" dirty="0">
-                <a:latin typeface="Lucida Console" panose="020B0609040504020204" pitchFamily="49" charset="0"/>
-              </a:rPr>
-              <a:t>pheromone levels </a:t>
-            </a:r>
-            <a:r>
-              <a:rPr lang="en-GB" sz="4000" dirty="0" smtClean="0">
-                <a:latin typeface="Lucida Console" panose="020B0609040504020204" pitchFamily="49" charset="0"/>
-              </a:rPr>
-              <a:t>of </a:t>
-            </a:r>
-            <a:r>
-              <a:rPr lang="en-GB" sz="4000" dirty="0">
-                <a:latin typeface="Lucida Console" panose="020B0609040504020204" pitchFamily="49" charset="0"/>
-              </a:rPr>
-              <a:t>given </a:t>
-            </a:r>
-            <a:r>
-              <a:rPr lang="en-GB" sz="4000" dirty="0" smtClean="0">
-                <a:latin typeface="Lucida Console" panose="020B0609040504020204" pitchFamily="49" charset="0"/>
-              </a:rPr>
-              <a:t>cell. After each operation, constraint propagation is applied to the Sudoku to determine which effect the ant’s decision had on the whole Sudoku. For an empty Sudoku, an ant would start randomly assigning values and excrete pheromone.</a:t>
-            </a:r>
-            <a:endParaRPr lang="en-GB" sz="4000" dirty="0">
-              <a:latin typeface="Lucida Console" panose="020B0609040504020204" pitchFamily="49" charset="0"/>
-            </a:endParaRPr>
-          </a:p>
-        </p:txBody>
-      </p:sp>
+      </p:pic>
     </p:spTree>
     <p:extLst>
       <p:ext uri="{BB962C8B-B14F-4D97-AF65-F5344CB8AC3E}">
@@ -4653,13 +4302,6 @@
   <p:clrMapOvr>
     <a:masterClrMapping/>
   </p:clrMapOvr>
-  <p:timing>
-    <p:tnLst>
-      <p:par>
-        <p:cTn id="1" dur="indefinite" restart="never" nodeType="tmRoot"/>
-      </p:par>
-    </p:tnLst>
-  </p:timing>
 </p:sld>
 </file>
 

</xml_diff>